<commit_message>
update notes in course overview slides
</commit_message>
<xml_diff>
--- a/slides/01_course_overview.pptx
+++ b/slides/01_course_overview.pptx
@@ -240,7 +240,7 @@
           <a:p>
             <a:fld id="{DB92F479-4B50-F243-9713-1B12EC2B4BDB}" type="datetimeFigureOut">
               <a:rPr lang="en-US" smtClean="0"/>
-              <a:t>12/12/2014</a:t>
+              <a:t>12/13/2014</a:t>
             </a:fld>
             <a:endParaRPr lang="en-US"/>
           </a:p>
@@ -828,8 +828,17 @@
           <a:p>
             <a:r>
               <a:rPr lang="en-US" baseline="0" dirty="0" smtClean="0"/>
-              <a:t>Communicate early and often – We want to know how you are doing with the course, what confuses you, what learning style works for you and what doesn’t – keep us updated so we can help you to be successful</a:t>
-            </a:r>
+              <a:t>Communicate early and often – We want to know how you are doing with the course, what confuses you, what learning style works for you and what doesn’t – keep us updated so we can help you to </a:t>
+            </a:r>
+            <a:r>
+              <a:rPr lang="en-US" baseline="0" smtClean="0"/>
+              <a:t>be </a:t>
+            </a:r>
+            <a:r>
+              <a:rPr lang="en-US" baseline="0" smtClean="0"/>
+              <a:t>successful – we are going to be checking in with you (one-on-one) throughout the course and getting your feedback</a:t>
+            </a:r>
+            <a:endParaRPr lang="en-US" baseline="0" dirty="0" smtClean="0"/>
           </a:p>
           <a:p>
             <a:endParaRPr lang="en-US" baseline="0" dirty="0" smtClean="0"/>
@@ -7951,7 +7960,7 @@
               </a14:hiddenLine>
             </a:ext>
             <a:ext uri="{FAA26D3D-D897-4be2-8F04-BA451C77F1D7}">
-              <ma14:placeholderFlag xmlns:ma14="http://schemas.microsoft.com/office/mac/drawingml/2011/main" xmlns="" val="1"/>
+              <ma14:placeholderFlag xmlns="" xmlns:ma14="http://schemas.microsoft.com/office/mac/drawingml/2011/main" val="1"/>
             </a:ext>
           </a:extLst>
         </p:spPr>
@@ -8238,7 +8247,7 @@
               </a14:hiddenLine>
             </a:ext>
             <a:ext uri="{FAA26D3D-D897-4be2-8F04-BA451C77F1D7}">
-              <ma14:placeholderFlag xmlns:ma14="http://schemas.microsoft.com/office/mac/drawingml/2011/main" xmlns="" val="1"/>
+              <ma14:placeholderFlag xmlns="" xmlns:ma14="http://schemas.microsoft.com/office/mac/drawingml/2011/main" val="1"/>
             </a:ext>
           </a:extLst>
         </p:spPr>

</xml_diff>